<commit_message>
Fixed issue with presentation
</commit_message>
<xml_diff>
--- a/Sprint Demo.pptx
+++ b/Sprint Demo.pptx
@@ -14,10 +14,10 @@
     <p:sldId id="259" r:id="rId8"/>
     <p:sldId id="263" r:id="rId9"/>
     <p:sldId id="261" r:id="rId10"/>
-    <p:sldId id="265" r:id="rId11"/>
+    <p:sldId id="270" r:id="rId11"/>
     <p:sldId id="264" r:id="rId12"/>
     <p:sldId id="266" r:id="rId13"/>
-    <p:sldId id="268" r:id="rId14"/>
+    <p:sldId id="269" r:id="rId14"/>
   </p:sldIdLst>
   <p:sldSz cx="9144000" cy="6858000" type="screen4x3"/>
   <p:notesSz cx="6858000" cy="9144000"/>
@@ -3979,10 +3979,89 @@
           </a:p>
         </p:txBody>
       </p:sp>
+      <p:pic>
+        <p:nvPicPr>
+          <p:cNvPr id="7" name="Picture 6" descr="Screen Shot 2014-12-03 at 10.04.26 PM.png"/>
+          <p:cNvPicPr>
+            <a:picLocks noChangeAspect="1"/>
+          </p:cNvPicPr>
+          <p:nvPr/>
+        </p:nvPicPr>
+        <p:blipFill>
+          <a:blip r:embed="rId2">
+            <a:extLst>
+              <a:ext uri="{28A0092B-C50C-407E-A947-70E740481C1C}">
+                <a14:useLocalDpi xmlns:a14="http://schemas.microsoft.com/office/drawing/2010/main" val="0"/>
+              </a:ext>
+            </a:extLst>
+          </a:blip>
+          <a:stretch>
+            <a:fillRect/>
+          </a:stretch>
+        </p:blipFill>
+        <p:spPr>
+          <a:xfrm>
+            <a:off x="901700" y="1943455"/>
+            <a:ext cx="7340600" cy="4432300"/>
+          </a:xfrm>
+          <a:prstGeom prst="rect">
+            <a:avLst/>
+          </a:prstGeom>
+        </p:spPr>
+      </p:pic>
+      <p:sp>
+        <p:nvSpPr>
+          <p:cNvPr id="8" name="Rectangle 7"/>
+          <p:cNvSpPr/>
+          <p:nvPr/>
+        </p:nvSpPr>
+        <p:spPr>
+          <a:xfrm>
+            <a:off x="1944031" y="3324141"/>
+            <a:ext cx="6098613" cy="156799"/>
+          </a:xfrm>
+          <a:prstGeom prst="rect">
+            <a:avLst/>
+          </a:prstGeom>
+          <a:solidFill>
+            <a:schemeClr val="accent1">
+              <a:lumMod val="40000"/>
+              <a:lumOff val="60000"/>
+              <a:alpha val="49000"/>
+            </a:schemeClr>
+          </a:solidFill>
+          <a:ln>
+            <a:noFill/>
+          </a:ln>
+          <a:effectLst/>
+        </p:spPr>
+        <p:style>
+          <a:lnRef idx="1">
+            <a:schemeClr val="accent1"/>
+          </a:lnRef>
+          <a:fillRef idx="3">
+            <a:schemeClr val="accent1"/>
+          </a:fillRef>
+          <a:effectRef idx="2">
+            <a:schemeClr val="accent1"/>
+          </a:effectRef>
+          <a:fontRef idx="minor">
+            <a:schemeClr val="lt1"/>
+          </a:fontRef>
+        </p:style>
+        <p:txBody>
+          <a:bodyPr rtlCol="0" anchor="ctr"/>
+          <a:lstStyle/>
+          <a:p>
+            <a:pPr algn="ctr"/>
+            <a:endParaRPr lang="en-US"/>
+          </a:p>
+        </p:txBody>
+      </p:sp>
     </p:spTree>
     <p:extLst>
       <p:ext uri="{BB962C8B-B14F-4D97-AF65-F5344CB8AC3E}">
-        <p14:creationId xmlns:p14="http://schemas.microsoft.com/office/powerpoint/2010/main" val="914035407"/>
+        <p14:creationId xmlns:p14="http://schemas.microsoft.com/office/powerpoint/2010/main" val="936115315"/>
       </p:ext>
     </p:extLst>
   </p:cSld>
@@ -4260,35 +4339,53 @@
           </a:p>
         </p:txBody>
       </p:sp>
-      <p:sp>
-        <p:nvSpPr>
-          <p:cNvPr id="7" name="Content Placeholder 6"/>
-          <p:cNvSpPr>
-            <a:spLocks noGrp="1"/>
-          </p:cNvSpPr>
+      <p:pic>
+        <p:nvPicPr>
+          <p:cNvPr id="4" name="Content Placeholder 3" descr="Screen Shot 2014-12-03 at 10.00.33 PM.png"/>
+          <p:cNvPicPr>
+            <a:picLocks noGrp="1" noChangeAspect="1"/>
+          </p:cNvPicPr>
           <p:nvPr>
             <p:ph idx="1"/>
           </p:nvPr>
-        </p:nvSpPr>
-        <p:spPr/>
-        <p:txBody>
-          <a:bodyPr/>
-          <a:lstStyle/>
-          <a:p>
-            <a:endParaRPr lang="en-US"/>
-          </a:p>
-        </p:txBody>
-      </p:sp>
+        </p:nvPicPr>
+        <p:blipFill>
+          <a:blip r:embed="rId2">
+            <a:extLst>
+              <a:ext uri="{28A0092B-C50C-407E-A947-70E740481C1C}">
+                <a14:useLocalDpi xmlns:a14="http://schemas.microsoft.com/office/drawing/2010/main" val="0"/>
+              </a:ext>
+            </a:extLst>
+          </a:blip>
+          <a:srcRect l="-47183" r="-47183"/>
+          <a:stretch>
+            <a:fillRect/>
+          </a:stretch>
+        </p:blipFill>
+        <p:spPr>
+          <a:xfrm>
+            <a:off x="-2194875" y="1756149"/>
+            <a:ext cx="13529828" cy="4876451"/>
+          </a:xfrm>
+        </p:spPr>
+      </p:pic>
     </p:spTree>
     <p:extLst>
       <p:ext uri="{BB962C8B-B14F-4D97-AF65-F5344CB8AC3E}">
-        <p14:creationId xmlns:p14="http://schemas.microsoft.com/office/powerpoint/2010/main" val="955044358"/>
+        <p14:creationId xmlns:p14="http://schemas.microsoft.com/office/powerpoint/2010/main" val="1142167743"/>
       </p:ext>
     </p:extLst>
   </p:cSld>
   <p:clrMapOvr>
     <a:masterClrMapping/>
   </p:clrMapOvr>
+  <p:timing>
+    <p:tnLst>
+      <p:par>
+        <p:cTn xmlns:p14="http://schemas.microsoft.com/office/powerpoint/2010/main" id="1" dur="indefinite" restart="never" nodeType="tmRoot"/>
+      </p:par>
+    </p:tnLst>
+  </p:timing>
 </p:sld>
 </file>
 
@@ -4383,11 +4480,7 @@
           <a:p>
             <a:r>
               <a:rPr lang="en-US" sz="2800" dirty="0" smtClean="0"/>
-              <a:t>Argument Parser makes it possible for users to parse command line arguments. </a:t>
-            </a:r>
-            <a:r>
-              <a:rPr lang="en-US" sz="2800" dirty="0" smtClean="0"/>
-              <a:t>The product owner predefines the arguments, while the parser determines how exactly to parse the arguments.</a:t>
+              <a:t>Argument Parser makes it possible for users to parse command line arguments. The product owner predefines the arguments, while the parser determines how exactly to parse the arguments.</a:t>
             </a:r>
             <a:r>
               <a:rPr lang="en-US" sz="2800" dirty="0"/>
@@ -4662,7 +4755,15 @@
           <a:p>
             <a:r>
               <a:rPr lang="en-US" dirty="0" smtClean="0"/>
-              <a:t>Positional arguments (or simply arguments), are the arguments expected to be present by the parser.</a:t>
+              <a:t>Positional arguments (or </a:t>
+            </a:r>
+            <a:r>
+              <a:rPr lang="en-US" dirty="0" smtClean="0"/>
+              <a:t>simply arguments</a:t>
+            </a:r>
+            <a:r>
+              <a:rPr lang="en-US" dirty="0" smtClean="0"/>
+              <a:t>), are the arguments expected to be present by the parser.</a:t>
             </a:r>
           </a:p>
           <a:p>

</xml_diff>